<commit_message>
* Added the following SIMD DP functions : fma, sqrt, hypot, fabs, copysign, fmax, fmin, fdim, trunc, floor, ceil, round, rint, nextafter, frexp, fmod, modf * Updated logo * Testing will be executed with make test command * Potential bug fixes
</commit_message>
<xml_diff>
--- a/doc/sleeflogo.pptx
+++ b/doc/sleeflogo.pptx
@@ -5,9 +5,10 @@
     <p:sldMasterId id="2147483648" r:id="rId1"/>
   </p:sldMasterIdLst>
   <p:sldIdLst>
-    <p:sldId id="257" r:id="rId2"/>
-    <p:sldId id="258" r:id="rId3"/>
-    <p:sldId id="256" r:id="rId4"/>
+    <p:sldId id="259" r:id="rId2"/>
+    <p:sldId id="257" r:id="rId3"/>
+    <p:sldId id="258" r:id="rId4"/>
+    <p:sldId id="256" r:id="rId5"/>
   </p:sldIdLst>
   <p:sldSz cx="9144000" cy="6858000" type="screen4x3"/>
   <p:notesSz cx="6858000" cy="9144000"/>
@@ -108,7 +109,7 @@
   </p:defaultTextStyle>
   <p:extLst>
     <p:ext uri="{EFAFB233-063F-42B5-8137-9DF3F51BA10A}">
-      <p15:sldGuideLst xmlns:p15="http://schemas.microsoft.com/office/powerpoint/2012/main">
+      <p15:sldGuideLst xmlns="" xmlns:p15="http://schemas.microsoft.com/office/powerpoint/2012/main">
         <p15:guide id="1" orient="horz" pos="2160">
           <p15:clr>
             <a:srgbClr val="A4A3A4"/>
@@ -306,7 +307,7 @@
           <a:p>
             <a:fld id="{CDFF9E0C-BD50-4A3B-B38F-1839D1842F92}" type="datetimeFigureOut">
               <a:rPr kumimoji="1" lang="ja-JP" altLang="en-US" smtClean="0"/>
-              <a:t>2017/2/17</a:t>
+              <a:t>2017/2/27</a:t>
             </a:fld>
             <a:endParaRPr kumimoji="1" lang="ja-JP" altLang="en-US"/>
           </a:p>
@@ -508,7 +509,7 @@
           <a:p>
             <a:fld id="{CDFF9E0C-BD50-4A3B-B38F-1839D1842F92}" type="datetimeFigureOut">
               <a:rPr kumimoji="1" lang="ja-JP" altLang="en-US" smtClean="0"/>
-              <a:t>2017/2/17</a:t>
+              <a:t>2017/2/27</a:t>
             </a:fld>
             <a:endParaRPr kumimoji="1" lang="ja-JP" altLang="en-US"/>
           </a:p>
@@ -720,7 +721,7 @@
           <a:p>
             <a:fld id="{CDFF9E0C-BD50-4A3B-B38F-1839D1842F92}" type="datetimeFigureOut">
               <a:rPr kumimoji="1" lang="ja-JP" altLang="en-US" smtClean="0"/>
-              <a:t>2017/2/17</a:t>
+              <a:t>2017/2/27</a:t>
             </a:fld>
             <a:endParaRPr kumimoji="1" lang="ja-JP" altLang="en-US"/>
           </a:p>
@@ -922,7 +923,7 @@
           <a:p>
             <a:fld id="{CDFF9E0C-BD50-4A3B-B38F-1839D1842F92}" type="datetimeFigureOut">
               <a:rPr kumimoji="1" lang="ja-JP" altLang="en-US" smtClean="0"/>
-              <a:t>2017/2/17</a:t>
+              <a:t>2017/2/27</a:t>
             </a:fld>
             <a:endParaRPr kumimoji="1" lang="ja-JP" altLang="en-US"/>
           </a:p>
@@ -1168,7 +1169,7 @@
           <a:p>
             <a:fld id="{CDFF9E0C-BD50-4A3B-B38F-1839D1842F92}" type="datetimeFigureOut">
               <a:rPr kumimoji="1" lang="ja-JP" altLang="en-US" smtClean="0"/>
-              <a:t>2017/2/17</a:t>
+              <a:t>2017/2/27</a:t>
             </a:fld>
             <a:endParaRPr kumimoji="1" lang="ja-JP" altLang="en-US"/>
           </a:p>
@@ -1520,7 +1521,7 @@
           <a:p>
             <a:fld id="{CDFF9E0C-BD50-4A3B-B38F-1839D1842F92}" type="datetimeFigureOut">
               <a:rPr kumimoji="1" lang="ja-JP" altLang="en-US" smtClean="0"/>
-              <a:t>2017/2/17</a:t>
+              <a:t>2017/2/27</a:t>
             </a:fld>
             <a:endParaRPr kumimoji="1" lang="ja-JP" altLang="en-US"/>
           </a:p>
@@ -2006,7 +2007,7 @@
           <a:p>
             <a:fld id="{CDFF9E0C-BD50-4A3B-B38F-1839D1842F92}" type="datetimeFigureOut">
               <a:rPr kumimoji="1" lang="ja-JP" altLang="en-US" smtClean="0"/>
-              <a:t>2017/2/17</a:t>
+              <a:t>2017/2/27</a:t>
             </a:fld>
             <a:endParaRPr kumimoji="1" lang="ja-JP" altLang="en-US"/>
           </a:p>
@@ -2124,7 +2125,7 @@
           <a:p>
             <a:fld id="{CDFF9E0C-BD50-4A3B-B38F-1839D1842F92}" type="datetimeFigureOut">
               <a:rPr kumimoji="1" lang="ja-JP" altLang="en-US" smtClean="0"/>
-              <a:t>2017/2/17</a:t>
+              <a:t>2017/2/27</a:t>
             </a:fld>
             <a:endParaRPr kumimoji="1" lang="ja-JP" altLang="en-US"/>
           </a:p>
@@ -2219,7 +2220,7 @@
           <a:p>
             <a:fld id="{CDFF9E0C-BD50-4A3B-B38F-1839D1842F92}" type="datetimeFigureOut">
               <a:rPr kumimoji="1" lang="ja-JP" altLang="en-US" smtClean="0"/>
-              <a:t>2017/2/17</a:t>
+              <a:t>2017/2/27</a:t>
             </a:fld>
             <a:endParaRPr kumimoji="1" lang="ja-JP" altLang="en-US"/>
           </a:p>
@@ -2528,7 +2529,7 @@
           <a:p>
             <a:fld id="{CDFF9E0C-BD50-4A3B-B38F-1839D1842F92}" type="datetimeFigureOut">
               <a:rPr kumimoji="1" lang="ja-JP" altLang="en-US" smtClean="0"/>
-              <a:t>2017/2/17</a:t>
+              <a:t>2017/2/27</a:t>
             </a:fld>
             <a:endParaRPr kumimoji="1" lang="ja-JP" altLang="en-US"/>
           </a:p>
@@ -2781,7 +2782,7 @@
           <a:p>
             <a:fld id="{CDFF9E0C-BD50-4A3B-B38F-1839D1842F92}" type="datetimeFigureOut">
               <a:rPr kumimoji="1" lang="ja-JP" altLang="en-US" smtClean="0"/>
-              <a:t>2017/2/17</a:t>
+              <a:t>2017/2/27</a:t>
             </a:fld>
             <a:endParaRPr kumimoji="1" lang="ja-JP" altLang="en-US"/>
           </a:p>
@@ -3026,7 +3027,7 @@
           <a:p>
             <a:fld id="{CDFF9E0C-BD50-4A3B-B38F-1839D1842F92}" type="datetimeFigureOut">
               <a:rPr kumimoji="1" lang="ja-JP" altLang="en-US" smtClean="0"/>
-              <a:t>2017/2/17</a:t>
+              <a:t>2017/2/27</a:t>
             </a:fld>
             <a:endParaRPr kumimoji="1" lang="ja-JP" altLang="en-US"/>
           </a:p>
@@ -3385,6 +3386,152 @@
 </file>
 
 <file path=ppt/slides/slide1.xml><?xml version="1.0" encoding="utf-8"?>
+<p:sld xmlns:a="http://schemas.openxmlformats.org/drawingml/2006/main" xmlns:r="http://schemas.openxmlformats.org/officeDocument/2006/relationships" xmlns:p="http://schemas.openxmlformats.org/presentationml/2006/main">
+  <p:cSld>
+    <p:spTree>
+      <p:nvGrpSpPr>
+        <p:cNvPr id="1" name=""/>
+        <p:cNvGrpSpPr/>
+        <p:nvPr/>
+      </p:nvGrpSpPr>
+      <p:grpSpPr>
+        <a:xfrm>
+          <a:off x="0" y="0"/>
+          <a:ext cx="0" cy="0"/>
+          <a:chOff x="0" y="0"/>
+          <a:chExt cx="0" cy="0"/>
+        </a:xfrm>
+      </p:grpSpPr>
+      <p:pic>
+        <p:nvPicPr>
+          <p:cNvPr id="1026" name="Picture 2"/>
+          <p:cNvPicPr>
+            <a:picLocks noChangeAspect="1" noChangeArrowheads="1"/>
+          </p:cNvPicPr>
+          <p:nvPr/>
+        </p:nvPicPr>
+        <p:blipFill>
+          <a:blip r:embed="rId2">
+            <a:extLst>
+              <a:ext uri="{28A0092B-C50C-407E-A947-70E740481C1C}">
+                <a14:useLocalDpi xmlns:a14="http://schemas.microsoft.com/office/drawing/2010/main" val="0"/>
+              </a:ext>
+            </a:extLst>
+          </a:blip>
+          <a:stretch>
+            <a:fillRect/>
+          </a:stretch>
+        </p:blipFill>
+        <p:spPr bwMode="auto">
+          <a:xfrm rot="20427014">
+            <a:off x="594387" y="1201114"/>
+            <a:ext cx="7700344" cy="4448981"/>
+          </a:xfrm>
+          <a:prstGeom prst="rect">
+            <a:avLst/>
+          </a:prstGeom>
+          <a:noFill/>
+          <a:extLst>
+            <a:ext uri="{909E8E84-426E-40DD-AFC4-6F175D3DCCD1}">
+              <a14:hiddenFill xmlns:a14="http://schemas.microsoft.com/office/drawing/2010/main">
+                <a:solidFill>
+                  <a:srgbClr val="FFFFFF"/>
+                </a:solidFill>
+              </a14:hiddenFill>
+            </a:ext>
+          </a:extLst>
+        </p:spPr>
+      </p:pic>
+      <p:sp>
+        <p:nvSpPr>
+          <p:cNvPr id="8" name="テキスト ボックス 7"/>
+          <p:cNvSpPr txBox="1"/>
+          <p:nvPr/>
+        </p:nvSpPr>
+        <p:spPr>
+          <a:xfrm>
+            <a:off x="2733895" y="1577468"/>
+            <a:ext cx="5226111" cy="2062103"/>
+          </a:xfrm>
+          <a:prstGeom prst="rect">
+            <a:avLst/>
+          </a:prstGeom>
+          <a:noFill/>
+        </p:spPr>
+        <p:txBody>
+          <a:bodyPr wrap="none" rtlCol="0">
+            <a:spAutoFit/>
+          </a:bodyPr>
+          <a:lstStyle/>
+          <a:p>
+            <a:r>
+              <a:rPr kumimoji="1" lang="en-US" altLang="ja-JP" sz="12800" dirty="0" smtClean="0">
+                <a:latin typeface="Georgia" pitchFamily="18" charset="0"/>
+              </a:rPr>
+              <a:t>SLEEF</a:t>
+            </a:r>
+            <a:endParaRPr kumimoji="1" lang="ja-JP" altLang="en-US" sz="12800" dirty="0">
+              <a:latin typeface="Georgia" pitchFamily="18" charset="0"/>
+            </a:endParaRPr>
+          </a:p>
+        </p:txBody>
+      </p:sp>
+      <p:sp>
+        <p:nvSpPr>
+          <p:cNvPr id="9" name="テキスト ボックス 8"/>
+          <p:cNvSpPr txBox="1"/>
+          <p:nvPr/>
+        </p:nvSpPr>
+        <p:spPr>
+          <a:xfrm>
+            <a:off x="1707549" y="3962398"/>
+            <a:ext cx="6248827" cy="1077218"/>
+          </a:xfrm>
+          <a:prstGeom prst="rect">
+            <a:avLst/>
+          </a:prstGeom>
+          <a:noFill/>
+        </p:spPr>
+        <p:txBody>
+          <a:bodyPr wrap="none" rtlCol="0">
+            <a:spAutoFit/>
+          </a:bodyPr>
+          <a:lstStyle/>
+          <a:p>
+            <a:r>
+              <a:rPr kumimoji="1" lang="en-US" altLang="ja-JP" sz="3200" dirty="0" smtClean="0">
+                <a:latin typeface="Georgia" pitchFamily="18" charset="0"/>
+              </a:rPr>
+              <a:t>           SIMD Library for</a:t>
+            </a:r>
+          </a:p>
+          <a:p>
+            <a:r>
+              <a:rPr kumimoji="1" lang="en-US" altLang="ja-JP" sz="3200" dirty="0" smtClean="0">
+                <a:latin typeface="Georgia" pitchFamily="18" charset="0"/>
+              </a:rPr>
+              <a:t>Evaluating Elementary Functions</a:t>
+            </a:r>
+            <a:endParaRPr kumimoji="1" lang="ja-JP" altLang="en-US" sz="3200" dirty="0">
+              <a:latin typeface="Georgia" pitchFamily="18" charset="0"/>
+            </a:endParaRPr>
+          </a:p>
+        </p:txBody>
+      </p:sp>
+    </p:spTree>
+    <p:extLst>
+      <p:ext uri="{BB962C8B-B14F-4D97-AF65-F5344CB8AC3E}">
+        <p14:creationId xmlns:p14="http://schemas.microsoft.com/office/powerpoint/2010/main" val="3251860674"/>
+      </p:ext>
+    </p:extLst>
+  </p:cSld>
+  <p:clrMapOvr>
+    <a:masterClrMapping/>
+  </p:clrMapOvr>
+</p:sld>
+</file>
+
+<file path=ppt/slides/slide2.xml><?xml version="1.0" encoding="utf-8"?>
 <p:sld xmlns:a="http://schemas.openxmlformats.org/drawingml/2006/main" xmlns:r="http://schemas.openxmlformats.org/officeDocument/2006/relationships" xmlns:p="http://schemas.openxmlformats.org/presentationml/2006/main">
   <p:cSld>
     <p:spTree>
@@ -5881,7 +6028,7 @@
 </p:sld>
 </file>
 
-<file path=ppt/slides/slide2.xml><?xml version="1.0" encoding="utf-8"?>
+<file path=ppt/slides/slide3.xml><?xml version="1.0" encoding="utf-8"?>
 <p:sld xmlns:a="http://schemas.openxmlformats.org/drawingml/2006/main" xmlns:r="http://schemas.openxmlformats.org/officeDocument/2006/relationships" xmlns:p="http://schemas.openxmlformats.org/presentationml/2006/main">
   <p:cSld>
     <p:spTree>
@@ -7081,7 +7228,7 @@
 </p:sld>
 </file>
 
-<file path=ppt/slides/slide3.xml><?xml version="1.0" encoding="utf-8"?>
+<file path=ppt/slides/slide4.xml><?xml version="1.0" encoding="utf-8"?>
 <p:sld xmlns:a="http://schemas.openxmlformats.org/drawingml/2006/main" xmlns:r="http://schemas.openxmlformats.org/officeDocument/2006/relationships" xmlns:p="http://schemas.openxmlformats.org/presentationml/2006/main">
   <p:cSld>
     <p:spTree>

</xml_diff>